<commit_message>
get coding with me  - edit JavaScript resource (variable and type)
</commit_message>
<xml_diff>
--- a/31/200803_JavaScript_variable_type.pptx
+++ b/31/200803_JavaScript_variable_type.pptx
@@ -248,7 +248,7 @@
           <a:p>
             <a:fld id="{9FE52F76-AF59-42F6-9CE2-B65810388E55}" type="datetimeFigureOut">
               <a:rPr lang="ko-KR" altLang="en-US" smtClean="0"/>
-              <a:t>2020-08-04</a:t>
+              <a:t>2020-08-12</a:t>
             </a:fld>
             <a:endParaRPr lang="ko-KR" altLang="en-US"/>
           </a:p>
@@ -413,7 +413,7 @@
           <a:p>
             <a:fld id="{75C19CB4-4756-4824-8E84-477C40131107}" type="datetimeFigureOut">
               <a:rPr lang="ko-KR" altLang="en-US" smtClean="0"/>
-              <a:t>2020-08-04</a:t>
+              <a:t>2020-08-12</a:t>
             </a:fld>
             <a:endParaRPr lang="ko-KR" altLang="en-US"/>
           </a:p>
@@ -3343,7 +3343,7 @@
           <a:p>
             <a:fld id="{D9D21D2B-B161-4A2C-A0F2-324F8DD03E7E}" type="datetimeFigureOut">
               <a:rPr lang="ko-KR" altLang="en-US" smtClean="0"/>
-              <a:t>2020-08-04</a:t>
+              <a:t>2020-08-12</a:t>
             </a:fld>
             <a:endParaRPr lang="ko-KR" altLang="en-US"/>
           </a:p>
@@ -3550,7 +3550,7 @@
           <a:p>
             <a:fld id="{D9D21D2B-B161-4A2C-A0F2-324F8DD03E7E}" type="datetimeFigureOut">
               <a:rPr lang="ko-KR" altLang="en-US" smtClean="0"/>
-              <a:t>2020-08-04</a:t>
+              <a:t>2020-08-12</a:t>
             </a:fld>
             <a:endParaRPr lang="ko-KR" altLang="en-US"/>
           </a:p>
@@ -3730,7 +3730,7 @@
           <a:p>
             <a:fld id="{D9D21D2B-B161-4A2C-A0F2-324F8DD03E7E}" type="datetimeFigureOut">
               <a:rPr lang="ko-KR" altLang="en-US" smtClean="0"/>
-              <a:t>2020-08-04</a:t>
+              <a:t>2020-08-12</a:t>
             </a:fld>
             <a:endParaRPr lang="ko-KR" altLang="en-US"/>
           </a:p>
@@ -3900,7 +3900,7 @@
           <a:p>
             <a:fld id="{D9D21D2B-B161-4A2C-A0F2-324F8DD03E7E}" type="datetimeFigureOut">
               <a:rPr lang="ko-KR" altLang="en-US" smtClean="0"/>
-              <a:t>2020-08-04</a:t>
+              <a:t>2020-08-12</a:t>
             </a:fld>
             <a:endParaRPr lang="ko-KR" altLang="en-US"/>
           </a:p>
@@ -4153,7 +4153,7 @@
           <a:p>
             <a:fld id="{D9D21D2B-B161-4A2C-A0F2-324F8DD03E7E}" type="datetimeFigureOut">
               <a:rPr lang="ko-KR" altLang="en-US" smtClean="0"/>
-              <a:t>2020-08-04</a:t>
+              <a:t>2020-08-12</a:t>
             </a:fld>
             <a:endParaRPr lang="ko-KR" altLang="en-US"/>
           </a:p>
@@ -4392,7 +4392,7 @@
           <a:p>
             <a:fld id="{D9D21D2B-B161-4A2C-A0F2-324F8DD03E7E}" type="datetimeFigureOut">
               <a:rPr lang="ko-KR" altLang="en-US" smtClean="0"/>
-              <a:t>2020-08-04</a:t>
+              <a:t>2020-08-12</a:t>
             </a:fld>
             <a:endParaRPr lang="ko-KR" altLang="en-US"/>
           </a:p>
@@ -4766,7 +4766,7 @@
           <a:p>
             <a:fld id="{D9D21D2B-B161-4A2C-A0F2-324F8DD03E7E}" type="datetimeFigureOut">
               <a:rPr lang="ko-KR" altLang="en-US" smtClean="0"/>
-              <a:t>2020-08-04</a:t>
+              <a:t>2020-08-12</a:t>
             </a:fld>
             <a:endParaRPr lang="ko-KR" altLang="en-US"/>
           </a:p>
@@ -4884,7 +4884,7 @@
           <a:p>
             <a:fld id="{D9D21D2B-B161-4A2C-A0F2-324F8DD03E7E}" type="datetimeFigureOut">
               <a:rPr lang="ko-KR" altLang="en-US" smtClean="0"/>
-              <a:t>2020-08-04</a:t>
+              <a:t>2020-08-12</a:t>
             </a:fld>
             <a:endParaRPr lang="ko-KR" altLang="en-US"/>
           </a:p>
@@ -4979,7 +4979,7 @@
           <a:p>
             <a:fld id="{D9D21D2B-B161-4A2C-A0F2-324F8DD03E7E}" type="datetimeFigureOut">
               <a:rPr lang="ko-KR" altLang="en-US" smtClean="0"/>
-              <a:t>2020-08-04</a:t>
+              <a:t>2020-08-12</a:t>
             </a:fld>
             <a:endParaRPr lang="ko-KR" altLang="en-US"/>
           </a:p>
@@ -5256,7 +5256,7 @@
           <a:p>
             <a:fld id="{D9D21D2B-B161-4A2C-A0F2-324F8DD03E7E}" type="datetimeFigureOut">
               <a:rPr lang="ko-KR" altLang="en-US" smtClean="0"/>
-              <a:t>2020-08-04</a:t>
+              <a:t>2020-08-12</a:t>
             </a:fld>
             <a:endParaRPr lang="ko-KR" altLang="en-US"/>
           </a:p>
@@ -5513,7 +5513,7 @@
           <a:p>
             <a:fld id="{D9D21D2B-B161-4A2C-A0F2-324F8DD03E7E}" type="datetimeFigureOut">
               <a:rPr lang="ko-KR" altLang="en-US" smtClean="0"/>
-              <a:t>2020-08-04</a:t>
+              <a:t>2020-08-12</a:t>
             </a:fld>
             <a:endParaRPr lang="ko-KR" altLang="en-US"/>
           </a:p>
@@ -5729,7 +5729,7 @@
           <a:p>
             <a:fld id="{D9D21D2B-B161-4A2C-A0F2-324F8DD03E7E}" type="datetimeFigureOut">
               <a:rPr lang="ko-KR" altLang="en-US" smtClean="0"/>
-              <a:t>2020-08-04</a:t>
+              <a:t>2020-08-12</a:t>
             </a:fld>
             <a:endParaRPr lang="ko-KR" altLang="en-US"/>
           </a:p>
@@ -10824,21 +10824,7 @@
                 <a:latin typeface="+mn-ea"/>
                 <a:cs typeface="맑은 고딕 Semilight" panose="020B0502040204020203" pitchFamily="50" charset="-127"/>
               </a:rPr>
-              <a:t>타입을 </a:t>
-            </a:r>
-            <a:r>
-              <a:rPr lang="ko-KR" altLang="en-US" sz="1400">
-                <a:ln>
-                  <a:solidFill>
-                    <a:schemeClr val="tx1">
-                      <a:alpha val="29000"/>
-                    </a:schemeClr>
-                  </a:solidFill>
-                </a:ln>
-                <a:latin typeface="+mn-ea"/>
-                <a:cs typeface="맑은 고딕 Semilight" panose="020B0502040204020203" pitchFamily="50" charset="-127"/>
-              </a:rPr>
-              <a:t>변환하여 </a:t>
+              <a:t>타입을 변환하여 </a:t>
             </a:r>
             <a:r>
               <a:rPr lang="ko-KR" altLang="en-US" sz="1400" smtClean="0">
@@ -10918,21 +10904,7 @@
                 <a:latin typeface="+mn-ea"/>
                 <a:cs typeface="맑은 고딕 Semilight" panose="020B0502040204020203" pitchFamily="50" charset="-127"/>
               </a:rPr>
-              <a:t>문자열 값이 오길 기대하는 곳에 </a:t>
-            </a:r>
-            <a:r>
-              <a:rPr lang="ko-KR" altLang="en-US" sz="1400">
-                <a:ln>
-                  <a:solidFill>
-                    <a:schemeClr val="tx1">
-                      <a:alpha val="29000"/>
-                    </a:schemeClr>
-                  </a:solidFill>
-                </a:ln>
-                <a:latin typeface="+mn-ea"/>
-                <a:cs typeface="맑은 고딕 Semilight" panose="020B0502040204020203" pitchFamily="50" charset="-127"/>
-              </a:rPr>
-              <a:t>숫자가 </a:t>
+              <a:t>문자열 값이 오길 기대하는 곳에 숫자가 </a:t>
             </a:r>
             <a:r>
               <a:rPr lang="ko-KR" altLang="en-US" sz="1400" smtClean="0">
@@ -11001,21 +10973,7 @@
                 <a:latin typeface="+mn-ea"/>
                 <a:cs typeface="맑은 고딕 Semilight" panose="020B0502040204020203" pitchFamily="50" charset="-127"/>
               </a:rPr>
-              <a:t>자바스크립트는 알아서 숫자를 문자열로 </a:t>
-            </a:r>
-            <a:r>
-              <a:rPr lang="ko-KR" altLang="en-US" sz="1400">
-                <a:ln>
-                  <a:solidFill>
-                    <a:schemeClr val="tx1">
-                      <a:alpha val="29000"/>
-                    </a:schemeClr>
-                  </a:solidFill>
-                </a:ln>
-                <a:latin typeface="+mn-ea"/>
-                <a:cs typeface="맑은 고딕 Semilight" panose="020B0502040204020203" pitchFamily="50" charset="-127"/>
-              </a:rPr>
-              <a:t>변환하여 </a:t>
+              <a:t>자바스크립트는 알아서 숫자를 문자열로 변환하여 </a:t>
             </a:r>
             <a:r>
               <a:rPr lang="ko-KR" altLang="en-US" sz="1400" smtClean="0">
@@ -11081,21 +11039,7 @@
                 <a:latin typeface="+mn-ea"/>
                 <a:cs typeface="맑은 고딕 Semilight" panose="020B0502040204020203" pitchFamily="50" charset="-127"/>
               </a:rPr>
-              <a:t>세 번째 예제에서 뺄셈 연산을 위해 문자열이 숫자로 변환되어야 </a:t>
-            </a:r>
-            <a:r>
-              <a:rPr lang="ko-KR" altLang="en-US" sz="1400">
-                <a:ln>
-                  <a:solidFill>
-                    <a:schemeClr val="tx1">
-                      <a:alpha val="29000"/>
-                    </a:schemeClr>
-                  </a:solidFill>
-                </a:ln>
-                <a:latin typeface="+mn-ea"/>
-                <a:cs typeface="맑은 고딕 Semilight" panose="020B0502040204020203" pitchFamily="50" charset="-127"/>
-              </a:rPr>
-              <a:t>하나</a:t>
+              <a:t>세 번째 예제에서 뺄셈 연산을 위해 문자열이 숫자로 변환되어야 하나</a:t>
             </a:r>
             <a:r>
               <a:rPr lang="en-US" altLang="ko-KR" sz="1400" smtClean="0">
@@ -11150,21 +11094,7 @@
                 <a:latin typeface="+mn-ea"/>
                 <a:cs typeface="맑은 고딕 Semilight" panose="020B0502040204020203" pitchFamily="50" charset="-127"/>
               </a:rPr>
-              <a:t>해당 문자열은 두 번째 예제의 문자열과는 달리 숫자로 변환될 수 </a:t>
-            </a:r>
-            <a:r>
-              <a:rPr lang="ko-KR" altLang="en-US" sz="1400">
-                <a:ln>
-                  <a:solidFill>
-                    <a:schemeClr val="tx1">
-                      <a:alpha val="29000"/>
-                    </a:schemeClr>
-                  </a:solidFill>
-                </a:ln>
-                <a:latin typeface="+mn-ea"/>
-                <a:cs typeface="맑은 고딕 Semilight" panose="020B0502040204020203" pitchFamily="50" charset="-127"/>
-              </a:rPr>
-              <a:t>없는 </a:t>
+              <a:t>해당 문자열은 두 번째 예제의 문자열과는 달리 숫자로 변환될 수 없는 </a:t>
             </a:r>
             <a:r>
               <a:rPr lang="ko-KR" altLang="en-US" sz="1400" smtClean="0">
@@ -11661,10 +11591,10 @@
                 <a:cs typeface="맑은 고딕 Semilight" panose="020B0502040204020203" pitchFamily="50" charset="-127"/>
                 <a:sym typeface="Wingdings" panose="05000000000000000000" pitchFamily="2" charset="2"/>
               </a:rPr>
-              <a:t>자바스크립트 변수의 </a:t>
-            </a:r>
-            <a:r>
-              <a:rPr lang="ko-KR" altLang="en-US" sz="1800">
+              <a:t>자바스크립트 변수의 명시적 타입 변환</a:t>
+            </a:r>
+            <a:r>
+              <a:rPr lang="en-US" altLang="ko-KR" sz="1800">
                 <a:ln>
                   <a:solidFill>
                     <a:schemeClr val="tx1">
@@ -11676,37 +11606,7 @@
                 <a:cs typeface="맑은 고딕 Semilight" panose="020B0502040204020203" pitchFamily="50" charset="-127"/>
                 <a:sym typeface="Wingdings" panose="05000000000000000000" pitchFamily="2" charset="2"/>
               </a:rPr>
-              <a:t>명시적 타입 변환</a:t>
-            </a:r>
-            <a:r>
-              <a:rPr lang="en-US" altLang="ko-KR" sz="1800">
-                <a:ln>
-                  <a:solidFill>
-                    <a:schemeClr val="tx1">
-                      <a:alpha val="29000"/>
-                    </a:schemeClr>
-                  </a:solidFill>
-                </a:ln>
-                <a:latin typeface="+mn-ea"/>
-                <a:cs typeface="맑은 고딕 Semilight" panose="020B0502040204020203" pitchFamily="50" charset="-127"/>
-                <a:sym typeface="Wingdings" panose="05000000000000000000" pitchFamily="2" charset="2"/>
-              </a:rPr>
-              <a:t>(explicit </a:t>
-            </a:r>
-            <a:r>
-              <a:rPr lang="en-US" altLang="ko-KR" sz="1800">
-                <a:ln>
-                  <a:solidFill>
-                    <a:schemeClr val="tx1">
-                      <a:alpha val="29000"/>
-                    </a:schemeClr>
-                  </a:solidFill>
-                </a:ln>
-                <a:latin typeface="+mn-ea"/>
-                <a:cs typeface="맑은 고딕 Semilight" panose="020B0502040204020203" pitchFamily="50" charset="-127"/>
-                <a:sym typeface="Wingdings" panose="05000000000000000000" pitchFamily="2" charset="2"/>
-              </a:rPr>
-              <a:t>type </a:t>
+              <a:t>(explicit type </a:t>
             </a:r>
             <a:r>
               <a:rPr lang="en-US" altLang="ko-KR" sz="1800" smtClean="0">
@@ -11760,21 +11660,7 @@
                 <a:latin typeface="+mn-ea"/>
                 <a:cs typeface="맑은 고딕 Semilight" panose="020B0502040204020203" pitchFamily="50" charset="-127"/>
               </a:rPr>
-              <a:t>자바스크립트에서는 묵시적 타입 변환을 </a:t>
-            </a:r>
-            <a:r>
-              <a:rPr lang="ko-KR" altLang="en-US" sz="1400">
-                <a:ln>
-                  <a:solidFill>
-                    <a:schemeClr val="tx1">
-                      <a:alpha val="29000"/>
-                    </a:schemeClr>
-                  </a:solidFill>
-                </a:ln>
-                <a:latin typeface="+mn-ea"/>
-                <a:cs typeface="맑은 고딕 Semilight" panose="020B0502040204020203" pitchFamily="50" charset="-127"/>
-              </a:rPr>
-              <a:t>많이 </a:t>
+              <a:t>자바스크립트에서는 묵시적 타입 변환을 많이 </a:t>
             </a:r>
             <a:r>
               <a:rPr lang="ko-KR" altLang="en-US" sz="1400" smtClean="0">
@@ -11872,21 +11758,7 @@
                 <a:latin typeface="+mn-ea"/>
                 <a:cs typeface="맑은 고딕 Semilight" panose="020B0502040204020203" pitchFamily="50" charset="-127"/>
               </a:rPr>
-              <a:t>타입을 변환할 </a:t>
-            </a:r>
-            <a:r>
-              <a:rPr lang="ko-KR" altLang="en-US" sz="1400">
-                <a:ln>
-                  <a:solidFill>
-                    <a:schemeClr val="tx1">
-                      <a:alpha val="29000"/>
-                    </a:schemeClr>
-                  </a:solidFill>
-                </a:ln>
-                <a:latin typeface="+mn-ea"/>
-                <a:cs typeface="맑은 고딕 Semilight" panose="020B0502040204020203" pitchFamily="50" charset="-127"/>
-              </a:rPr>
-              <a:t>방법도 </a:t>
+              <a:t>타입을 변환할 방법도 </a:t>
             </a:r>
             <a:r>
               <a:rPr lang="ko-KR" altLang="en-US" sz="1400" smtClean="0">
@@ -11938,21 +11810,7 @@
                 <a:latin typeface="+mn-ea"/>
                 <a:cs typeface="맑은 고딕 Semilight" panose="020B0502040204020203" pitchFamily="50" charset="-127"/>
               </a:rPr>
-              <a:t>명시적 타입 변환을 위해 자바스크립트가 제공하는 전역 </a:t>
-            </a:r>
-            <a:r>
-              <a:rPr lang="ko-KR" altLang="en-US" sz="1400">
-                <a:ln>
-                  <a:solidFill>
-                    <a:schemeClr val="tx1">
-                      <a:alpha val="29000"/>
-                    </a:schemeClr>
-                  </a:solidFill>
-                </a:ln>
-                <a:latin typeface="+mn-ea"/>
-                <a:cs typeface="맑은 고딕 Semilight" panose="020B0502040204020203" pitchFamily="50" charset="-127"/>
-              </a:rPr>
-              <a:t>함수는 </a:t>
+              <a:t>명시적 타입 변환을 위해 자바스크립트가 제공하는 전역 함수는 </a:t>
             </a:r>
             <a:r>
               <a:rPr lang="ko-KR" altLang="en-US" sz="1400" smtClean="0">
@@ -12210,17 +12068,6 @@
               </a:rPr>
               <a:t>()</a:t>
             </a:r>
-            <a:endParaRPr lang="en-US" altLang="ko-KR" sz="1200">
-              <a:ln>
-                <a:solidFill>
-                  <a:schemeClr val="tx1">
-                    <a:alpha val="29000"/>
-                  </a:schemeClr>
-                </a:solidFill>
-              </a:ln>
-              <a:latin typeface="+mn-ea"/>
-              <a:cs typeface="맑은 고딕 Semilight" panose="020B0502040204020203" pitchFamily="50" charset="-127"/>
-            </a:endParaRPr>
           </a:p>
         </p:txBody>
       </p:sp>
@@ -13038,37 +12885,7 @@
                 <a:cs typeface="맑은 고딕 Semilight" panose="020B0502040204020203" pitchFamily="50" charset="-127"/>
                 <a:sym typeface="Wingdings" panose="05000000000000000000" pitchFamily="2" charset="2"/>
               </a:rPr>
-              <a:t>자바스크립트 변수의 </a:t>
-            </a:r>
-            <a:r>
-              <a:rPr lang="ko-KR" altLang="en-US" sz="1800">
-                <a:ln>
-                  <a:solidFill>
-                    <a:schemeClr val="tx1">
-                      <a:alpha val="29000"/>
-                    </a:schemeClr>
-                  </a:solidFill>
-                </a:ln>
-                <a:latin typeface="+mn-ea"/>
-                <a:cs typeface="맑은 고딕 Semilight" panose="020B0502040204020203" pitchFamily="50" charset="-127"/>
-                <a:sym typeface="Wingdings" panose="05000000000000000000" pitchFamily="2" charset="2"/>
-              </a:rPr>
-              <a:t>숫자를 </a:t>
-            </a:r>
-            <a:r>
-              <a:rPr lang="ko-KR" altLang="en-US" sz="1800">
-                <a:ln>
-                  <a:solidFill>
-                    <a:schemeClr val="tx1">
-                      <a:alpha val="29000"/>
-                    </a:schemeClr>
-                  </a:solidFill>
-                </a:ln>
-                <a:latin typeface="+mn-ea"/>
-                <a:cs typeface="맑은 고딕 Semilight" panose="020B0502040204020203" pitchFamily="50" charset="-127"/>
-                <a:sym typeface="Wingdings" panose="05000000000000000000" pitchFamily="2" charset="2"/>
-              </a:rPr>
-              <a:t>문자열로 </a:t>
+              <a:t>자바스크립트 변수의 숫자를 문자열로 </a:t>
             </a:r>
             <a:r>
               <a:rPr lang="ko-KR" altLang="en-US" sz="1800" smtClean="0">
@@ -13150,21 +12967,7 @@
                 <a:latin typeface="+mn-ea"/>
                 <a:cs typeface="맑은 고딕 Semilight" panose="020B0502040204020203" pitchFamily="50" charset="-127"/>
               </a:rPr>
-              <a:t>함수를 </a:t>
-            </a:r>
-            <a:r>
-              <a:rPr lang="ko-KR" altLang="en-US" sz="1400">
-                <a:ln>
-                  <a:solidFill>
-                    <a:schemeClr val="tx1">
-                      <a:alpha val="29000"/>
-                    </a:schemeClr>
-                  </a:solidFill>
-                </a:ln>
-                <a:latin typeface="+mn-ea"/>
-                <a:cs typeface="맑은 고딕 Semilight" panose="020B0502040204020203" pitchFamily="50" charset="-127"/>
-              </a:rPr>
-              <a:t>사용하는 </a:t>
+              <a:t>함수를 사용하는 </a:t>
             </a:r>
             <a:r>
               <a:rPr lang="ko-KR" altLang="en-US" sz="1400" smtClean="0">
@@ -13272,21 +13075,7 @@
                 <a:latin typeface="+mn-ea"/>
                 <a:cs typeface="맑은 고딕 Semilight" panose="020B0502040204020203" pitchFamily="50" charset="-127"/>
               </a:rPr>
-              <a:t>를 제외한 모든 타입의 값이 </a:t>
-            </a:r>
-            <a:r>
-              <a:rPr lang="ko-KR" altLang="en-US" sz="1400">
-                <a:ln>
-                  <a:solidFill>
-                    <a:schemeClr val="tx1">
-                      <a:alpha val="29000"/>
-                    </a:schemeClr>
-                  </a:solidFill>
-                </a:ln>
-                <a:latin typeface="+mn-ea"/>
-                <a:cs typeface="맑은 고딕 Semilight" panose="020B0502040204020203" pitchFamily="50" charset="-127"/>
-              </a:rPr>
-              <a:t>가지고 </a:t>
+              <a:t>를 제외한 모든 타입의 값이 가지고 </a:t>
             </a:r>
             <a:r>
               <a:rPr lang="ko-KR" altLang="en-US" sz="1400" smtClean="0">
@@ -13369,21 +13158,7 @@
                 <a:latin typeface="+mn-ea"/>
                 <a:cs typeface="맑은 고딕 Semilight" panose="020B0502040204020203" pitchFamily="50" charset="-127"/>
               </a:rPr>
-              <a:t>메소드를 사용할 </a:t>
-            </a:r>
-            <a:r>
-              <a:rPr lang="ko-KR" altLang="en-US" sz="1400">
-                <a:ln>
-                  <a:solidFill>
-                    <a:schemeClr val="tx1">
-                      <a:alpha val="29000"/>
-                    </a:schemeClr>
-                  </a:solidFill>
-                </a:ln>
-                <a:latin typeface="+mn-ea"/>
-                <a:cs typeface="맑은 고딕 Semilight" panose="020B0502040204020203" pitchFamily="50" charset="-127"/>
-              </a:rPr>
-              <a:t>수도 </a:t>
+              <a:t>메소드를 사용할 수도 </a:t>
             </a:r>
             <a:r>
               <a:rPr lang="ko-KR" altLang="en-US" sz="1400" smtClean="0">
@@ -13463,21 +13238,7 @@
                 <a:latin typeface="+mn-ea"/>
                 <a:cs typeface="맑은 고딕 Semilight" panose="020B0502040204020203" pitchFamily="50" charset="-127"/>
               </a:rPr>
-              <a:t>객체는 숫자를 </a:t>
-            </a:r>
-            <a:r>
-              <a:rPr lang="ko-KR" altLang="en-US" sz="1400">
-                <a:ln>
-                  <a:solidFill>
-                    <a:schemeClr val="tx1">
-                      <a:alpha val="29000"/>
-                    </a:schemeClr>
-                  </a:solidFill>
-                </a:ln>
-                <a:latin typeface="+mn-ea"/>
-                <a:cs typeface="맑은 고딕 Semilight" panose="020B0502040204020203" pitchFamily="50" charset="-127"/>
-              </a:rPr>
-              <a:t>문자열로 </a:t>
+              <a:t>객체는 숫자를 문자열로 </a:t>
             </a:r>
             <a:r>
               <a:rPr lang="ko-KR" altLang="en-US" sz="1400" smtClean="0">
@@ -13546,21 +13307,7 @@
                 <a:latin typeface="+mn-ea"/>
                 <a:cs typeface="맑은 고딕 Semilight" panose="020B0502040204020203" pitchFamily="50" charset="-127"/>
               </a:rPr>
-              <a:t>다음과 같은 메소드를 </a:t>
-            </a:r>
-            <a:r>
-              <a:rPr lang="ko-KR" altLang="en-US" sz="1400">
-                <a:ln>
-                  <a:solidFill>
-                    <a:schemeClr val="tx1">
-                      <a:alpha val="29000"/>
-                    </a:schemeClr>
-                  </a:solidFill>
-                </a:ln>
-                <a:latin typeface="+mn-ea"/>
-                <a:cs typeface="맑은 고딕 Semilight" panose="020B0502040204020203" pitchFamily="50" charset="-127"/>
-              </a:rPr>
-              <a:t>별도로 </a:t>
+              <a:t>다음과 같은 메소드를 별도로 </a:t>
             </a:r>
             <a:r>
               <a:rPr lang="ko-KR" altLang="en-US" sz="1400" smtClean="0">
@@ -13710,17 +13457,6 @@
               </a:rPr>
               <a:t>()</a:t>
             </a:r>
-            <a:endParaRPr lang="en-US" altLang="ko-KR" sz="1200">
-              <a:ln>
-                <a:solidFill>
-                  <a:schemeClr val="tx1">
-                    <a:alpha val="29000"/>
-                  </a:schemeClr>
-                </a:solidFill>
-              </a:ln>
-              <a:latin typeface="+mn-ea"/>
-              <a:cs typeface="맑은 고딕 Semilight" panose="020B0502040204020203" pitchFamily="50" charset="-127"/>
-            </a:endParaRPr>
           </a:p>
         </p:txBody>
       </p:sp>
@@ -13927,37 +13663,7 @@
                 <a:cs typeface="맑은 고딕 Semilight" panose="020B0502040204020203" pitchFamily="50" charset="-127"/>
                 <a:sym typeface="Wingdings" panose="05000000000000000000" pitchFamily="2" charset="2"/>
               </a:rPr>
-              <a:t>자바스크립트 변수의 </a:t>
-            </a:r>
-            <a:r>
-              <a:rPr lang="ko-KR" altLang="en-US" sz="1800">
-                <a:ln>
-                  <a:solidFill>
-                    <a:schemeClr val="tx1">
-                      <a:alpha val="29000"/>
-                    </a:schemeClr>
-                  </a:solidFill>
-                </a:ln>
-                <a:latin typeface="+mn-ea"/>
-                <a:cs typeface="맑은 고딕 Semilight" panose="020B0502040204020203" pitchFamily="50" charset="-127"/>
-                <a:sym typeface="Wingdings" panose="05000000000000000000" pitchFamily="2" charset="2"/>
-              </a:rPr>
-              <a:t>불리언 값을 </a:t>
-            </a:r>
-            <a:r>
-              <a:rPr lang="ko-KR" altLang="en-US" sz="1800">
-                <a:ln>
-                  <a:solidFill>
-                    <a:schemeClr val="tx1">
-                      <a:alpha val="29000"/>
-                    </a:schemeClr>
-                  </a:solidFill>
-                </a:ln>
-                <a:latin typeface="+mn-ea"/>
-                <a:cs typeface="맑은 고딕 Semilight" panose="020B0502040204020203" pitchFamily="50" charset="-127"/>
-                <a:sym typeface="Wingdings" panose="05000000000000000000" pitchFamily="2" charset="2"/>
-              </a:rPr>
-              <a:t>문자열로 </a:t>
+              <a:t>자바스크립트 변수의 불리언 값을 문자열로 </a:t>
             </a:r>
             <a:r>
               <a:rPr lang="ko-KR" altLang="en-US" sz="1800" smtClean="0">
@@ -14067,21 +13773,7 @@
                 <a:latin typeface="+mn-ea"/>
                 <a:cs typeface="맑은 고딕 Semilight" panose="020B0502040204020203" pitchFamily="50" charset="-127"/>
               </a:rPr>
-              <a:t>메소드를 사용하는 </a:t>
-            </a:r>
-            <a:r>
-              <a:rPr lang="ko-KR" altLang="en-US" sz="1400">
-                <a:ln>
-                  <a:solidFill>
-                    <a:schemeClr val="tx1">
-                      <a:alpha val="29000"/>
-                    </a:schemeClr>
-                  </a:solidFill>
-                </a:ln>
-                <a:latin typeface="+mn-ea"/>
-                <a:cs typeface="맑은 고딕 Semilight" panose="020B0502040204020203" pitchFamily="50" charset="-127"/>
-              </a:rPr>
-              <a:t>방법이 </a:t>
+              <a:t>메소드를 사용하는 방법이 </a:t>
             </a:r>
             <a:r>
               <a:rPr lang="ko-KR" altLang="en-US" sz="1400" smtClean="0">
@@ -14314,37 +14006,7 @@
                 <a:cs typeface="맑은 고딕 Semilight" panose="020B0502040204020203" pitchFamily="50" charset="-127"/>
                 <a:sym typeface="Wingdings" panose="05000000000000000000" pitchFamily="2" charset="2"/>
               </a:rPr>
-              <a:t>자바스크립트 변수의 </a:t>
-            </a:r>
-            <a:r>
-              <a:rPr lang="ko-KR" altLang="en-US" sz="1800">
-                <a:ln>
-                  <a:solidFill>
-                    <a:schemeClr val="tx1">
-                      <a:alpha val="29000"/>
-                    </a:schemeClr>
-                  </a:solidFill>
-                </a:ln>
-                <a:latin typeface="+mn-ea"/>
-                <a:cs typeface="맑은 고딕 Semilight" panose="020B0502040204020203" pitchFamily="50" charset="-127"/>
-                <a:sym typeface="Wingdings" panose="05000000000000000000" pitchFamily="2" charset="2"/>
-              </a:rPr>
-              <a:t>날짜를 문자열이나 </a:t>
-            </a:r>
-            <a:r>
-              <a:rPr lang="ko-KR" altLang="en-US" sz="1800">
-                <a:ln>
-                  <a:solidFill>
-                    <a:schemeClr val="tx1">
-                      <a:alpha val="29000"/>
-                    </a:schemeClr>
-                  </a:solidFill>
-                </a:ln>
-                <a:latin typeface="+mn-ea"/>
-                <a:cs typeface="맑은 고딕 Semilight" panose="020B0502040204020203" pitchFamily="50" charset="-127"/>
-                <a:sym typeface="Wingdings" panose="05000000000000000000" pitchFamily="2" charset="2"/>
-              </a:rPr>
-              <a:t>숫자로 </a:t>
+              <a:t>자바스크립트 변수의 날짜를 문자열이나 숫자로 </a:t>
             </a:r>
             <a:r>
               <a:rPr lang="ko-KR" altLang="en-US" sz="1800" smtClean="0">
@@ -14454,21 +14116,7 @@
                 <a:latin typeface="+mn-ea"/>
                 <a:cs typeface="맑은 고딕 Semilight" panose="020B0502040204020203" pitchFamily="50" charset="-127"/>
               </a:rPr>
-              <a:t>메소드를 사용하는 </a:t>
-            </a:r>
-            <a:r>
-              <a:rPr lang="ko-KR" altLang="en-US" sz="1400">
-                <a:ln>
-                  <a:solidFill>
-                    <a:schemeClr val="tx1">
-                      <a:alpha val="29000"/>
-                    </a:schemeClr>
-                  </a:solidFill>
-                </a:ln>
-                <a:latin typeface="+mn-ea"/>
-                <a:cs typeface="맑은 고딕 Semilight" panose="020B0502040204020203" pitchFamily="50" charset="-127"/>
-              </a:rPr>
-              <a:t>방법이 </a:t>
+              <a:t>메소드를 사용하는 방법이 </a:t>
             </a:r>
             <a:r>
               <a:rPr lang="ko-KR" altLang="en-US" sz="1400" smtClean="0">
@@ -14548,21 +14196,7 @@
                 <a:latin typeface="+mn-ea"/>
                 <a:cs typeface="맑은 고딕 Semilight" panose="020B0502040204020203" pitchFamily="50" charset="-127"/>
               </a:rPr>
-              <a:t>객체는 문자열과 숫자로 모두 변환할 수 있는 </a:t>
-            </a:r>
-            <a:r>
-              <a:rPr lang="ko-KR" altLang="en-US" sz="1400">
-                <a:ln>
-                  <a:solidFill>
-                    <a:schemeClr val="tx1">
-                      <a:alpha val="29000"/>
-                    </a:schemeClr>
-                  </a:solidFill>
-                </a:ln>
-                <a:latin typeface="+mn-ea"/>
-                <a:cs typeface="맑은 고딕 Semilight" panose="020B0502040204020203" pitchFamily="50" charset="-127"/>
-              </a:rPr>
-              <a:t>유일한 </a:t>
+              <a:t>객체는 문자열과 숫자로 모두 변환할 수 있는 유일한 </a:t>
             </a:r>
             <a:r>
               <a:rPr lang="ko-KR" altLang="en-US" sz="1400" smtClean="0">
@@ -14642,21 +14276,7 @@
                 <a:latin typeface="+mn-ea"/>
                 <a:cs typeface="맑은 고딕 Semilight" panose="020B0502040204020203" pitchFamily="50" charset="-127"/>
               </a:rPr>
-              <a:t>객체는 날짜를 숫자로 변환하는 다음과 같은 메소드를 </a:t>
-            </a:r>
-            <a:r>
-              <a:rPr lang="ko-KR" altLang="en-US" sz="1400">
-                <a:ln>
-                  <a:solidFill>
-                    <a:schemeClr val="tx1">
-                      <a:alpha val="29000"/>
-                    </a:schemeClr>
-                  </a:solidFill>
-                </a:ln>
-                <a:latin typeface="+mn-ea"/>
-                <a:cs typeface="맑은 고딕 Semilight" panose="020B0502040204020203" pitchFamily="50" charset="-127"/>
-              </a:rPr>
-              <a:t>별도로 </a:t>
+              <a:t>객체는 날짜를 숫자로 변환하는 다음과 같은 메소드를 별도로 </a:t>
             </a:r>
             <a:r>
               <a:rPr lang="ko-KR" altLang="en-US" sz="1400" smtClean="0">
@@ -15210,37 +14830,7 @@
                 <a:cs typeface="맑은 고딕 Semilight" panose="020B0502040204020203" pitchFamily="50" charset="-127"/>
                 <a:sym typeface="Wingdings" panose="05000000000000000000" pitchFamily="2" charset="2"/>
               </a:rPr>
-              <a:t>자바스크립트 변수의 </a:t>
-            </a:r>
-            <a:r>
-              <a:rPr lang="ko-KR" altLang="en-US" sz="1800">
-                <a:ln>
-                  <a:solidFill>
-                    <a:schemeClr val="tx1">
-                      <a:alpha val="29000"/>
-                    </a:schemeClr>
-                  </a:solidFill>
-                </a:ln>
-                <a:latin typeface="+mn-ea"/>
-                <a:cs typeface="맑은 고딕 Semilight" panose="020B0502040204020203" pitchFamily="50" charset="-127"/>
-                <a:sym typeface="Wingdings" panose="05000000000000000000" pitchFamily="2" charset="2"/>
-              </a:rPr>
-              <a:t>날짜를 문자열이나 </a:t>
-            </a:r>
-            <a:r>
-              <a:rPr lang="ko-KR" altLang="en-US" sz="1800">
-                <a:ln>
-                  <a:solidFill>
-                    <a:schemeClr val="tx1">
-                      <a:alpha val="29000"/>
-                    </a:schemeClr>
-                  </a:solidFill>
-                </a:ln>
-                <a:latin typeface="+mn-ea"/>
-                <a:cs typeface="맑은 고딕 Semilight" panose="020B0502040204020203" pitchFamily="50" charset="-127"/>
-                <a:sym typeface="Wingdings" panose="05000000000000000000" pitchFamily="2" charset="2"/>
-              </a:rPr>
-              <a:t>숫자로 </a:t>
+              <a:t>자바스크립트 변수의 날짜를 문자열이나 숫자로 </a:t>
             </a:r>
             <a:r>
               <a:rPr lang="ko-KR" altLang="en-US" sz="1800" smtClean="0">
@@ -15475,37 +15065,7 @@
                 <a:cs typeface="맑은 고딕 Semilight" panose="020B0502040204020203" pitchFamily="50" charset="-127"/>
                 <a:sym typeface="Wingdings" panose="05000000000000000000" pitchFamily="2" charset="2"/>
               </a:rPr>
-              <a:t>자바스크립트 변수의 </a:t>
-            </a:r>
-            <a:r>
-              <a:rPr lang="ko-KR" altLang="en-US" sz="1800">
-                <a:ln>
-                  <a:solidFill>
-                    <a:schemeClr val="tx1">
-                      <a:alpha val="29000"/>
-                    </a:schemeClr>
-                  </a:solidFill>
-                </a:ln>
-                <a:latin typeface="+mn-ea"/>
-                <a:cs typeface="맑은 고딕 Semilight" panose="020B0502040204020203" pitchFamily="50" charset="-127"/>
-                <a:sym typeface="Wingdings" panose="05000000000000000000" pitchFamily="2" charset="2"/>
-              </a:rPr>
-              <a:t>날짜를 문자열이나 </a:t>
-            </a:r>
-            <a:r>
-              <a:rPr lang="ko-KR" altLang="en-US" sz="1800">
-                <a:ln>
-                  <a:solidFill>
-                    <a:schemeClr val="tx1">
-                      <a:alpha val="29000"/>
-                    </a:schemeClr>
-                  </a:solidFill>
-                </a:ln>
-                <a:latin typeface="+mn-ea"/>
-                <a:cs typeface="맑은 고딕 Semilight" panose="020B0502040204020203" pitchFamily="50" charset="-127"/>
-                <a:sym typeface="Wingdings" panose="05000000000000000000" pitchFamily="2" charset="2"/>
-              </a:rPr>
-              <a:t>숫자로 </a:t>
+              <a:t>자바스크립트 변수의 날짜를 문자열이나 숫자로 </a:t>
             </a:r>
             <a:r>
               <a:rPr lang="ko-KR" altLang="en-US" sz="1800" smtClean="0">
@@ -15740,37 +15300,7 @@
                 <a:cs typeface="맑은 고딕 Semilight" panose="020B0502040204020203" pitchFamily="50" charset="-127"/>
                 <a:sym typeface="Wingdings" panose="05000000000000000000" pitchFamily="2" charset="2"/>
               </a:rPr>
-              <a:t>자바스크립트 변수의 </a:t>
-            </a:r>
-            <a:r>
-              <a:rPr lang="ko-KR" altLang="en-US" sz="1800">
-                <a:ln>
-                  <a:solidFill>
-                    <a:schemeClr val="tx1">
-                      <a:alpha val="29000"/>
-                    </a:schemeClr>
-                  </a:solidFill>
-                </a:ln>
-                <a:latin typeface="+mn-ea"/>
-                <a:cs typeface="맑은 고딕 Semilight" panose="020B0502040204020203" pitchFamily="50" charset="-127"/>
-                <a:sym typeface="Wingdings" panose="05000000000000000000" pitchFamily="2" charset="2"/>
-              </a:rPr>
-              <a:t>문자열을 </a:t>
-            </a:r>
-            <a:r>
-              <a:rPr lang="ko-KR" altLang="en-US" sz="1800">
-                <a:ln>
-                  <a:solidFill>
-                    <a:schemeClr val="tx1">
-                      <a:alpha val="29000"/>
-                    </a:schemeClr>
-                  </a:solidFill>
-                </a:ln>
-                <a:latin typeface="+mn-ea"/>
-                <a:cs typeface="맑은 고딕 Semilight" panose="020B0502040204020203" pitchFamily="50" charset="-127"/>
-                <a:sym typeface="Wingdings" panose="05000000000000000000" pitchFamily="2" charset="2"/>
-              </a:rPr>
-              <a:t>숫자로 </a:t>
+              <a:t>자바스크립트 변수의 문자열을 숫자로 </a:t>
             </a:r>
             <a:r>
               <a:rPr lang="ko-KR" altLang="en-US" sz="1800" smtClean="0">
@@ -15852,21 +15382,7 @@
                 <a:latin typeface="+mn-ea"/>
                 <a:cs typeface="맑은 고딕 Semilight" panose="020B0502040204020203" pitchFamily="50" charset="-127"/>
               </a:rPr>
-              <a:t>함수를 사용하는 </a:t>
-            </a:r>
-            <a:r>
-              <a:rPr lang="ko-KR" altLang="en-US" sz="1400">
-                <a:ln>
-                  <a:solidFill>
-                    <a:schemeClr val="tx1">
-                      <a:alpha val="29000"/>
-                    </a:schemeClr>
-                  </a:solidFill>
-                </a:ln>
-                <a:latin typeface="+mn-ea"/>
-                <a:cs typeface="맑은 고딕 Semilight" panose="020B0502040204020203" pitchFamily="50" charset="-127"/>
-              </a:rPr>
-              <a:t>것입니다</a:t>
+              <a:t>함수를 사용하는 것입니다</a:t>
             </a:r>
             <a:r>
               <a:rPr lang="en-US" altLang="ko-KR" sz="1400" smtClean="0">
@@ -15918,21 +15434,7 @@
                 <a:latin typeface="+mn-ea"/>
                 <a:cs typeface="맑은 고딕 Semilight" panose="020B0502040204020203" pitchFamily="50" charset="-127"/>
               </a:rPr>
-              <a:t>자바스크립트는 문자열을 숫자로 변환해 주는 두 개의 전역 함수를 별도로 </a:t>
-            </a:r>
-            <a:r>
-              <a:rPr lang="ko-KR" altLang="en-US" sz="1400">
-                <a:ln>
-                  <a:solidFill>
-                    <a:schemeClr val="tx1">
-                      <a:alpha val="29000"/>
-                    </a:schemeClr>
-                  </a:solidFill>
-                </a:ln>
-                <a:latin typeface="+mn-ea"/>
-                <a:cs typeface="맑은 고딕 Semilight" panose="020B0502040204020203" pitchFamily="50" charset="-127"/>
-              </a:rPr>
-              <a:t>제공합니다</a:t>
+              <a:t>자바스크립트는 문자열을 숫자로 변환해 주는 두 개의 전역 함수를 별도로 제공합니다</a:t>
             </a:r>
             <a:r>
               <a:rPr lang="en-US" altLang="ko-KR" sz="1400" smtClean="0">
@@ -16244,37 +15746,7 @@
                 <a:cs typeface="맑은 고딕 Semilight" panose="020B0502040204020203" pitchFamily="50" charset="-127"/>
                 <a:sym typeface="Wingdings" panose="05000000000000000000" pitchFamily="2" charset="2"/>
               </a:rPr>
-              <a:t>자바스크립트 변수의 </a:t>
-            </a:r>
-            <a:r>
-              <a:rPr lang="ko-KR" altLang="en-US" sz="1800">
-                <a:ln>
-                  <a:solidFill>
-                    <a:schemeClr val="tx1">
-                      <a:alpha val="29000"/>
-                    </a:schemeClr>
-                  </a:solidFill>
-                </a:ln>
-                <a:latin typeface="+mn-ea"/>
-                <a:cs typeface="맑은 고딕 Semilight" panose="020B0502040204020203" pitchFamily="50" charset="-127"/>
-                <a:sym typeface="Wingdings" panose="05000000000000000000" pitchFamily="2" charset="2"/>
-              </a:rPr>
-              <a:t>불리언 값을 </a:t>
-            </a:r>
-            <a:r>
-              <a:rPr lang="ko-KR" altLang="en-US" sz="1800">
-                <a:ln>
-                  <a:solidFill>
-                    <a:schemeClr val="tx1">
-                      <a:alpha val="29000"/>
-                    </a:schemeClr>
-                  </a:solidFill>
-                </a:ln>
-                <a:latin typeface="+mn-ea"/>
-                <a:cs typeface="맑은 고딕 Semilight" panose="020B0502040204020203" pitchFamily="50" charset="-127"/>
-                <a:sym typeface="Wingdings" panose="05000000000000000000" pitchFamily="2" charset="2"/>
-              </a:rPr>
-              <a:t>숫자로 </a:t>
+              <a:t>자바스크립트 변수의 불리언 값을 숫자로 </a:t>
             </a:r>
             <a:r>
               <a:rPr lang="ko-KR" altLang="en-US" sz="1800" smtClean="0">
@@ -16356,21 +15828,7 @@
                 <a:latin typeface="+mn-ea"/>
                 <a:cs typeface="맑은 고딕 Semilight" panose="020B0502040204020203" pitchFamily="50" charset="-127"/>
               </a:rPr>
-              <a:t>함수를 </a:t>
-            </a:r>
-            <a:r>
-              <a:rPr lang="ko-KR" altLang="en-US" sz="1400">
-                <a:ln>
-                  <a:solidFill>
-                    <a:schemeClr val="tx1">
-                      <a:alpha val="29000"/>
-                    </a:schemeClr>
-                  </a:solidFill>
-                </a:ln>
-                <a:latin typeface="+mn-ea"/>
-                <a:cs typeface="맑은 고딕 Semilight" panose="020B0502040204020203" pitchFamily="50" charset="-127"/>
-              </a:rPr>
-              <a:t>사용하는 </a:t>
+              <a:t>함수를 사용하는 </a:t>
             </a:r>
             <a:r>
               <a:rPr lang="ko-KR" altLang="en-US" sz="1400" smtClean="0">

</xml_diff>